<commit_message>
Changed one growth curve after correction of a wrong datapoint generated new curves (without outlier)
</commit_message>
<xml_diff>
--- a/WRITING/Figures/Figure02_Constructs and growth curves/Figure02_Constructrs and growth curves.pptx
+++ b/WRITING/Figures/Figure02_Constructs and growth curves/Figure02_Constructrs and growth curves.pptx
@@ -199,7 +199,7 @@
           <a:p>
             <a:fld id="{3B1A9C01-5B2A-45DF-AF17-453DD9DBC440}" type="datetimeFigureOut">
               <a:rPr lang="en-DE" smtClean="0"/>
-              <a:t>03/05/2024</a:t>
+              <a:t>07/05/2024</a:t>
             </a:fld>
             <a:endParaRPr lang="en-DE"/>
           </a:p>
@@ -1236,7 +1236,7 @@
           <a:p>
             <a:fld id="{4C5F550B-ABB8-4034-B691-799CBCB67BB9}" type="datetimeFigureOut">
               <a:rPr lang="en-DE" smtClean="0"/>
-              <a:t>03/05/2024</a:t>
+              <a:t>07/05/2024</a:t>
             </a:fld>
             <a:endParaRPr lang="en-DE"/>
           </a:p>
@@ -1406,7 +1406,7 @@
           <a:p>
             <a:fld id="{4C5F550B-ABB8-4034-B691-799CBCB67BB9}" type="datetimeFigureOut">
               <a:rPr lang="en-DE" smtClean="0"/>
-              <a:t>03/05/2024</a:t>
+              <a:t>07/05/2024</a:t>
             </a:fld>
             <a:endParaRPr lang="en-DE"/>
           </a:p>
@@ -1586,7 +1586,7 @@
           <a:p>
             <a:fld id="{4C5F550B-ABB8-4034-B691-799CBCB67BB9}" type="datetimeFigureOut">
               <a:rPr lang="en-DE" smtClean="0"/>
-              <a:t>03/05/2024</a:t>
+              <a:t>07/05/2024</a:t>
             </a:fld>
             <a:endParaRPr lang="en-DE"/>
           </a:p>
@@ -1756,7 +1756,7 @@
           <a:p>
             <a:fld id="{4C5F550B-ABB8-4034-B691-799CBCB67BB9}" type="datetimeFigureOut">
               <a:rPr lang="en-DE" smtClean="0"/>
-              <a:t>03/05/2024</a:t>
+              <a:t>07/05/2024</a:t>
             </a:fld>
             <a:endParaRPr lang="en-DE"/>
           </a:p>
@@ -2000,7 +2000,7 @@
           <a:p>
             <a:fld id="{4C5F550B-ABB8-4034-B691-799CBCB67BB9}" type="datetimeFigureOut">
               <a:rPr lang="en-DE" smtClean="0"/>
-              <a:t>03/05/2024</a:t>
+              <a:t>07/05/2024</a:t>
             </a:fld>
             <a:endParaRPr lang="en-DE"/>
           </a:p>
@@ -2232,7 +2232,7 @@
           <a:p>
             <a:fld id="{4C5F550B-ABB8-4034-B691-799CBCB67BB9}" type="datetimeFigureOut">
               <a:rPr lang="en-DE" smtClean="0"/>
-              <a:t>03/05/2024</a:t>
+              <a:t>07/05/2024</a:t>
             </a:fld>
             <a:endParaRPr lang="en-DE"/>
           </a:p>
@@ -2599,7 +2599,7 @@
           <a:p>
             <a:fld id="{4C5F550B-ABB8-4034-B691-799CBCB67BB9}" type="datetimeFigureOut">
               <a:rPr lang="en-DE" smtClean="0"/>
-              <a:t>03/05/2024</a:t>
+              <a:t>07/05/2024</a:t>
             </a:fld>
             <a:endParaRPr lang="en-DE"/>
           </a:p>
@@ -2717,7 +2717,7 @@
           <a:p>
             <a:fld id="{4C5F550B-ABB8-4034-B691-799CBCB67BB9}" type="datetimeFigureOut">
               <a:rPr lang="en-DE" smtClean="0"/>
-              <a:t>03/05/2024</a:t>
+              <a:t>07/05/2024</a:t>
             </a:fld>
             <a:endParaRPr lang="en-DE"/>
           </a:p>
@@ -2812,7 +2812,7 @@
           <a:p>
             <a:fld id="{4C5F550B-ABB8-4034-B691-799CBCB67BB9}" type="datetimeFigureOut">
               <a:rPr lang="en-DE" smtClean="0"/>
-              <a:t>03/05/2024</a:t>
+              <a:t>07/05/2024</a:t>
             </a:fld>
             <a:endParaRPr lang="en-DE"/>
           </a:p>
@@ -3089,7 +3089,7 @@
           <a:p>
             <a:fld id="{4C5F550B-ABB8-4034-B691-799CBCB67BB9}" type="datetimeFigureOut">
               <a:rPr lang="en-DE" smtClean="0"/>
-              <a:t>03/05/2024</a:t>
+              <a:t>07/05/2024</a:t>
             </a:fld>
             <a:endParaRPr lang="en-DE"/>
           </a:p>
@@ -3346,7 +3346,7 @@
           <a:p>
             <a:fld id="{4C5F550B-ABB8-4034-B691-799CBCB67BB9}" type="datetimeFigureOut">
               <a:rPr lang="en-DE" smtClean="0"/>
-              <a:t>03/05/2024</a:t>
+              <a:t>07/05/2024</a:t>
             </a:fld>
             <a:endParaRPr lang="en-DE"/>
           </a:p>
@@ -3559,7 +3559,7 @@
           <a:p>
             <a:fld id="{4C5F550B-ABB8-4034-B691-799CBCB67BB9}" type="datetimeFigureOut">
               <a:rPr lang="en-DE" smtClean="0"/>
-              <a:t>03/05/2024</a:t>
+              <a:t>07/05/2024</a:t>
             </a:fld>
             <a:endParaRPr lang="en-DE"/>
           </a:p>
@@ -3966,35 +3966,6 @@
       </p:grpSpPr>
       <p:pic>
         <p:nvPicPr>
-          <p:cNvPr id="5" name="Picture 4">
-            <a:extLst>
-              <a:ext uri="{FF2B5EF4-FFF2-40B4-BE49-F238E27FC236}">
-                <a16:creationId xmlns:a16="http://schemas.microsoft.com/office/drawing/2014/main" id="{A35091DC-E004-42B5-AF01-E9DB546476EB}"/>
-              </a:ext>
-            </a:extLst>
-          </p:cNvPr>
-          <p:cNvPicPr>
-            <a:picLocks noChangeAspect="1"/>
-          </p:cNvPicPr>
-          <p:nvPr/>
-        </p:nvPicPr>
-        <p:blipFill rotWithShape="1">
-          <a:blip r:embed="rId3"/>
-          <a:srcRect l="4284" t="10965" r="6038"/>
-          <a:stretch/>
-        </p:blipFill>
-        <p:spPr>
-          <a:xfrm>
-            <a:off x="3515491" y="3131306"/>
-            <a:ext cx="2446481" cy="1821694"/>
-          </a:xfrm>
-          <a:prstGeom prst="rect">
-            <a:avLst/>
-          </a:prstGeom>
-        </p:spPr>
-      </p:pic>
-      <p:pic>
-        <p:nvPicPr>
           <p:cNvPr id="6" name="Picture 5">
             <a:extLst>
               <a:ext uri="{FF2B5EF4-FFF2-40B4-BE49-F238E27FC236}">
@@ -4008,7 +3979,7 @@
           <p:nvPr/>
         </p:nvPicPr>
         <p:blipFill rotWithShape="1">
-          <a:blip r:embed="rId4"/>
+          <a:blip r:embed="rId3"/>
           <a:srcRect l="4284" t="10964" r="6038"/>
           <a:stretch/>
         </p:blipFill>
@@ -4037,7 +4008,7 @@
           <p:nvPr/>
         </p:nvPicPr>
         <p:blipFill rotWithShape="1">
-          <a:blip r:embed="rId5">
+          <a:blip r:embed="rId4">
             <a:extLst>
               <a:ext uri="{28A0092B-C50C-407E-A947-70E740481C1C}">
                 <a14:useLocalDpi xmlns:a14="http://schemas.microsoft.com/office/drawing/2010/main" val="0"/>
@@ -4249,6 +4220,35 @@
           </a:p>
         </p:txBody>
       </p:sp>
+      <p:pic>
+        <p:nvPicPr>
+          <p:cNvPr id="2" name="Picture 1">
+            <a:extLst>
+              <a:ext uri="{FF2B5EF4-FFF2-40B4-BE49-F238E27FC236}">
+                <a16:creationId xmlns:a16="http://schemas.microsoft.com/office/drawing/2014/main" id="{A336E73F-CB57-43DA-AF38-8DC4848A215E}"/>
+              </a:ext>
+            </a:extLst>
+          </p:cNvPr>
+          <p:cNvPicPr>
+            <a:picLocks noChangeAspect="1"/>
+          </p:cNvPicPr>
+          <p:nvPr/>
+        </p:nvPicPr>
+        <p:blipFill rotWithShape="1">
+          <a:blip r:embed="rId5"/>
+          <a:srcRect l="4537" t="11190" r="6668"/>
+          <a:stretch/>
+        </p:blipFill>
+        <p:spPr>
+          <a:xfrm>
+            <a:off x="3693130" y="3131306"/>
+            <a:ext cx="2428439" cy="1821600"/>
+          </a:xfrm>
+          <a:prstGeom prst="rect">
+            <a:avLst/>
+          </a:prstGeom>
+        </p:spPr>
+      </p:pic>
     </p:spTree>
     <p:extLst>
       <p:ext uri="{BB962C8B-B14F-4D97-AF65-F5344CB8AC3E}">
@@ -4281,6 +4281,35 @@
       </p:grpSpPr>
       <p:pic>
         <p:nvPicPr>
+          <p:cNvPr id="18" name="Picture 17">
+            <a:extLst>
+              <a:ext uri="{FF2B5EF4-FFF2-40B4-BE49-F238E27FC236}">
+                <a16:creationId xmlns:a16="http://schemas.microsoft.com/office/drawing/2014/main" id="{CFAAE5F4-9E16-4F5F-9B41-111D66C48282}"/>
+              </a:ext>
+            </a:extLst>
+          </p:cNvPr>
+          <p:cNvPicPr>
+            <a:picLocks noChangeAspect="1"/>
+          </p:cNvPicPr>
+          <p:nvPr/>
+        </p:nvPicPr>
+        <p:blipFill rotWithShape="1">
+          <a:blip r:embed="rId3"/>
+          <a:srcRect l="4537" t="11190" r="6668"/>
+          <a:stretch/>
+        </p:blipFill>
+        <p:spPr>
+          <a:xfrm>
+            <a:off x="3570433" y="1397810"/>
+            <a:ext cx="2428439" cy="1821600"/>
+          </a:xfrm>
+          <a:prstGeom prst="rect">
+            <a:avLst/>
+          </a:prstGeom>
+        </p:spPr>
+      </p:pic>
+      <p:pic>
+        <p:nvPicPr>
           <p:cNvPr id="11" name="Picture 10">
             <a:extLst>
               <a:ext uri="{FF2B5EF4-FFF2-40B4-BE49-F238E27FC236}">
@@ -4294,7 +4323,7 @@
           <p:nvPr/>
         </p:nvPicPr>
         <p:blipFill rotWithShape="1">
-          <a:blip r:embed="rId3">
+          <a:blip r:embed="rId4">
             <a:extLst>
               <a:ext uri="{28A0092B-C50C-407E-A947-70E740481C1C}">
                 <a14:useLocalDpi xmlns:a14="http://schemas.microsoft.com/office/drawing/2010/main" val="0"/>
@@ -4365,7 +4394,7 @@
           <p:nvPr/>
         </p:nvPicPr>
         <p:blipFill rotWithShape="1">
-          <a:blip r:embed="rId3">
+          <a:blip r:embed="rId4">
             <a:extLst>
               <a:ext uri="{28A0092B-C50C-407E-A947-70E740481C1C}">
                 <a14:useLocalDpi xmlns:a14="http://schemas.microsoft.com/office/drawing/2010/main" val="0"/>
@@ -4379,35 +4408,6 @@
           <a:xfrm>
             <a:off x="3330173" y="442014"/>
             <a:ext cx="2545702" cy="865684"/>
-          </a:xfrm>
-          <a:prstGeom prst="rect">
-            <a:avLst/>
-          </a:prstGeom>
-        </p:spPr>
-      </p:pic>
-      <p:pic>
-        <p:nvPicPr>
-          <p:cNvPr id="12" name="Picture 11">
-            <a:extLst>
-              <a:ext uri="{FF2B5EF4-FFF2-40B4-BE49-F238E27FC236}">
-                <a16:creationId xmlns:a16="http://schemas.microsoft.com/office/drawing/2014/main" id="{5A00E8FA-3641-4B1C-8AF4-B8274F9AEF03}"/>
-              </a:ext>
-            </a:extLst>
-          </p:cNvPr>
-          <p:cNvPicPr>
-            <a:picLocks noChangeAspect="1"/>
-          </p:cNvPicPr>
-          <p:nvPr/>
-        </p:nvPicPr>
-        <p:blipFill rotWithShape="1">
-          <a:blip r:embed="rId4"/>
-          <a:srcRect l="4284" t="10965" r="6038"/>
-          <a:stretch/>
-        </p:blipFill>
-        <p:spPr>
-          <a:xfrm>
-            <a:off x="3515491" y="1397716"/>
-            <a:ext cx="2446481" cy="1821694"/>
           </a:xfrm>
           <a:prstGeom prst="rect">
             <a:avLst/>
@@ -4571,8 +4571,8 @@
         </p:nvSpPr>
         <p:spPr>
           <a:xfrm>
-            <a:off x="2031755" y="1411529"/>
-            <a:ext cx="532236" cy="459869"/>
+            <a:off x="2031754" y="1411529"/>
+            <a:ext cx="609845" cy="276101"/>
           </a:xfrm>
           <a:prstGeom prst="rect">
             <a:avLst/>
@@ -4631,6 +4631,35 @@
       </p:grpSpPr>
       <p:pic>
         <p:nvPicPr>
+          <p:cNvPr id="14" name="Picture 13">
+            <a:extLst>
+              <a:ext uri="{FF2B5EF4-FFF2-40B4-BE49-F238E27FC236}">
+                <a16:creationId xmlns:a16="http://schemas.microsoft.com/office/drawing/2014/main" id="{C95CCFFD-20B3-473F-A20D-C52FDB411196}"/>
+              </a:ext>
+            </a:extLst>
+          </p:cNvPr>
+          <p:cNvPicPr>
+            <a:picLocks noChangeAspect="1"/>
+          </p:cNvPicPr>
+          <p:nvPr/>
+        </p:nvPicPr>
+        <p:blipFill rotWithShape="1">
+          <a:blip r:embed="rId3"/>
+          <a:srcRect l="4537" t="11190" r="6668"/>
+          <a:stretch/>
+        </p:blipFill>
+        <p:spPr>
+          <a:xfrm>
+            <a:off x="3524877" y="3757558"/>
+            <a:ext cx="3258715" cy="2444400"/>
+          </a:xfrm>
+          <a:prstGeom prst="rect">
+            <a:avLst/>
+          </a:prstGeom>
+        </p:spPr>
+      </p:pic>
+      <p:pic>
+        <p:nvPicPr>
           <p:cNvPr id="4" name="Picture 3">
             <a:extLst>
               <a:ext uri="{FF2B5EF4-FFF2-40B4-BE49-F238E27FC236}">
@@ -4644,7 +4673,7 @@
           <p:nvPr/>
         </p:nvPicPr>
         <p:blipFill>
-          <a:blip r:embed="rId3"/>
+          <a:blip r:embed="rId4"/>
           <a:stretch>
             <a:fillRect/>
           </a:stretch>
@@ -4653,35 +4682,6 @@
           <a:xfrm>
             <a:off x="3356202" y="775270"/>
             <a:ext cx="3369672" cy="2826056"/>
-          </a:xfrm>
-          <a:prstGeom prst="rect">
-            <a:avLst/>
-          </a:prstGeom>
-        </p:spPr>
-      </p:pic>
-      <p:pic>
-        <p:nvPicPr>
-          <p:cNvPr id="5" name="Picture 4">
-            <a:extLst>
-              <a:ext uri="{FF2B5EF4-FFF2-40B4-BE49-F238E27FC236}">
-                <a16:creationId xmlns:a16="http://schemas.microsoft.com/office/drawing/2014/main" id="{A35091DC-E004-42B5-AF01-E9DB546476EB}"/>
-              </a:ext>
-            </a:extLst>
-          </p:cNvPr>
-          <p:cNvPicPr>
-            <a:picLocks noChangeAspect="1"/>
-          </p:cNvPicPr>
-          <p:nvPr/>
-        </p:nvPicPr>
-        <p:blipFill rotWithShape="1">
-          <a:blip r:embed="rId4"/>
-          <a:srcRect l="4284" t="10965" r="6038"/>
-          <a:stretch/>
-        </p:blipFill>
-        <p:spPr>
-          <a:xfrm>
-            <a:off x="3531738" y="3742915"/>
-            <a:ext cx="3284309" cy="2445556"/>
           </a:xfrm>
           <a:prstGeom prst="rect">
             <a:avLst/>
@@ -4892,7 +4892,7 @@
         </p:nvSpPr>
         <p:spPr>
           <a:xfrm>
-            <a:off x="5154235" y="3785304"/>
+            <a:off x="5041038" y="3785304"/>
             <a:ext cx="569387" cy="276101"/>
           </a:xfrm>
           <a:prstGeom prst="rect">

</xml_diff>